<commit_message>
todo: let those phones in library ping
</commit_message>
<xml_diff>
--- a/flowcharts.pptx
+++ b/flowcharts.pptx
@@ -12,6 +12,8 @@
     <p:sldId id="262" r:id="rId6"/>
     <p:sldId id="263" r:id="rId7"/>
     <p:sldId id="264" r:id="rId8"/>
+    <p:sldId id="265" r:id="rId9"/>
+    <p:sldId id="266" r:id="rId10"/>
   </p:sldIdLst>
   <p:sldSz cx="9144000" cy="6858000" type="screen4x3"/>
   <p:notesSz cx="6858000" cy="9144000"/>
@@ -249,7 +251,7 @@
           <a:p>
             <a:fld id="{A3CF4455-14D3-4C26-A17E-C18A2FA277AD}" type="datetimeFigureOut">
               <a:rPr lang="zh-CN" altLang="en-US" smtClean="0"/>
-              <a:t>2018/12/11</a:t>
+              <a:t>2018/12/12</a:t>
             </a:fld>
             <a:endParaRPr lang="zh-CN" altLang="en-US"/>
           </a:p>
@@ -419,7 +421,7 @@
           <a:p>
             <a:fld id="{A3CF4455-14D3-4C26-A17E-C18A2FA277AD}" type="datetimeFigureOut">
               <a:rPr lang="zh-CN" altLang="en-US" smtClean="0"/>
-              <a:t>2018/12/11</a:t>
+              <a:t>2018/12/12</a:t>
             </a:fld>
             <a:endParaRPr lang="zh-CN" altLang="en-US"/>
           </a:p>
@@ -599,7 +601,7 @@
           <a:p>
             <a:fld id="{A3CF4455-14D3-4C26-A17E-C18A2FA277AD}" type="datetimeFigureOut">
               <a:rPr lang="zh-CN" altLang="en-US" smtClean="0"/>
-              <a:t>2018/12/11</a:t>
+              <a:t>2018/12/12</a:t>
             </a:fld>
             <a:endParaRPr lang="zh-CN" altLang="en-US"/>
           </a:p>
@@ -769,7 +771,7 @@
           <a:p>
             <a:fld id="{A3CF4455-14D3-4C26-A17E-C18A2FA277AD}" type="datetimeFigureOut">
               <a:rPr lang="zh-CN" altLang="en-US" smtClean="0"/>
-              <a:t>2018/12/11</a:t>
+              <a:t>2018/12/12</a:t>
             </a:fld>
             <a:endParaRPr lang="zh-CN" altLang="en-US"/>
           </a:p>
@@ -1013,7 +1015,7 @@
           <a:p>
             <a:fld id="{A3CF4455-14D3-4C26-A17E-C18A2FA277AD}" type="datetimeFigureOut">
               <a:rPr lang="zh-CN" altLang="en-US" smtClean="0"/>
-              <a:t>2018/12/11</a:t>
+              <a:t>2018/12/12</a:t>
             </a:fld>
             <a:endParaRPr lang="zh-CN" altLang="en-US"/>
           </a:p>
@@ -1245,7 +1247,7 @@
           <a:p>
             <a:fld id="{A3CF4455-14D3-4C26-A17E-C18A2FA277AD}" type="datetimeFigureOut">
               <a:rPr lang="zh-CN" altLang="en-US" smtClean="0"/>
-              <a:t>2018/12/11</a:t>
+              <a:t>2018/12/12</a:t>
             </a:fld>
             <a:endParaRPr lang="zh-CN" altLang="en-US"/>
           </a:p>
@@ -1612,7 +1614,7 @@
           <a:p>
             <a:fld id="{A3CF4455-14D3-4C26-A17E-C18A2FA277AD}" type="datetimeFigureOut">
               <a:rPr lang="zh-CN" altLang="en-US" smtClean="0"/>
-              <a:t>2018/12/11</a:t>
+              <a:t>2018/12/12</a:t>
             </a:fld>
             <a:endParaRPr lang="zh-CN" altLang="en-US"/>
           </a:p>
@@ -1730,7 +1732,7 @@
           <a:p>
             <a:fld id="{A3CF4455-14D3-4C26-A17E-C18A2FA277AD}" type="datetimeFigureOut">
               <a:rPr lang="zh-CN" altLang="en-US" smtClean="0"/>
-              <a:t>2018/12/11</a:t>
+              <a:t>2018/12/12</a:t>
             </a:fld>
             <a:endParaRPr lang="zh-CN" altLang="en-US"/>
           </a:p>
@@ -1825,7 +1827,7 @@
           <a:p>
             <a:fld id="{A3CF4455-14D3-4C26-A17E-C18A2FA277AD}" type="datetimeFigureOut">
               <a:rPr lang="zh-CN" altLang="en-US" smtClean="0"/>
-              <a:t>2018/12/11</a:t>
+              <a:t>2018/12/12</a:t>
             </a:fld>
             <a:endParaRPr lang="zh-CN" altLang="en-US"/>
           </a:p>
@@ -2102,7 +2104,7 @@
           <a:p>
             <a:fld id="{A3CF4455-14D3-4C26-A17E-C18A2FA277AD}" type="datetimeFigureOut">
               <a:rPr lang="zh-CN" altLang="en-US" smtClean="0"/>
-              <a:t>2018/12/11</a:t>
+              <a:t>2018/12/12</a:t>
             </a:fld>
             <a:endParaRPr lang="zh-CN" altLang="en-US"/>
           </a:p>
@@ -2359,7 +2361,7 @@
           <a:p>
             <a:fld id="{A3CF4455-14D3-4C26-A17E-C18A2FA277AD}" type="datetimeFigureOut">
               <a:rPr lang="zh-CN" altLang="en-US" smtClean="0"/>
-              <a:t>2018/12/11</a:t>
+              <a:t>2018/12/12</a:t>
             </a:fld>
             <a:endParaRPr lang="zh-CN" altLang="en-US"/>
           </a:p>
@@ -2572,7 +2574,7 @@
           <a:p>
             <a:fld id="{A3CF4455-14D3-4C26-A17E-C18A2FA277AD}" type="datetimeFigureOut">
               <a:rPr lang="zh-CN" altLang="en-US" smtClean="0"/>
-              <a:t>2018/12/11</a:t>
+              <a:t>2018/12/12</a:t>
             </a:fld>
             <a:endParaRPr lang="zh-CN" altLang="en-US"/>
           </a:p>
@@ -9756,6 +9758,2429 @@
 </p:sld>
 </file>
 
+<file path=ppt/slides/slide8.xml><?xml version="1.0" encoding="utf-8"?>
+<p:sld xmlns:a="http://schemas.openxmlformats.org/drawingml/2006/main" xmlns:r="http://schemas.openxmlformats.org/officeDocument/2006/relationships" xmlns:p="http://schemas.openxmlformats.org/presentationml/2006/main">
+  <p:cSld>
+    <p:spTree>
+      <p:nvGrpSpPr>
+        <p:cNvPr id="1" name=""/>
+        <p:cNvGrpSpPr/>
+        <p:nvPr/>
+      </p:nvGrpSpPr>
+      <p:grpSpPr>
+        <a:xfrm>
+          <a:off x="0" y="0"/>
+          <a:ext cx="0" cy="0"/>
+          <a:chOff x="0" y="0"/>
+          <a:chExt cx="0" cy="0"/>
+        </a:xfrm>
+      </p:grpSpPr>
+      <p:grpSp>
+        <p:nvGrpSpPr>
+          <p:cNvPr id="48" name="组合 47"/>
+          <p:cNvGrpSpPr/>
+          <p:nvPr/>
+        </p:nvGrpSpPr>
+        <p:grpSpPr>
+          <a:xfrm>
+            <a:off x="427028" y="654186"/>
+            <a:ext cx="5878524" cy="4373628"/>
+            <a:chOff x="427028" y="654186"/>
+            <a:chExt cx="5878524" cy="4373628"/>
+          </a:xfrm>
+        </p:grpSpPr>
+        <p:sp>
+          <p:nvSpPr>
+            <p:cNvPr id="4" name="圆角矩形 3"/>
+            <p:cNvSpPr/>
+            <p:nvPr/>
+          </p:nvSpPr>
+          <p:spPr>
+            <a:xfrm>
+              <a:off x="1487075" y="1549034"/>
+              <a:ext cx="1347564" cy="238898"/>
+            </a:xfrm>
+            <a:prstGeom prst="roundRect">
+              <a:avLst/>
+            </a:prstGeom>
+          </p:spPr>
+          <p:style>
+            <a:lnRef idx="2">
+              <a:schemeClr val="dk1"/>
+            </a:lnRef>
+            <a:fillRef idx="1">
+              <a:schemeClr val="lt1"/>
+            </a:fillRef>
+            <a:effectRef idx="0">
+              <a:schemeClr val="dk1"/>
+            </a:effectRef>
+            <a:fontRef idx="minor">
+              <a:schemeClr val="dk1"/>
+            </a:fontRef>
+          </p:style>
+          <p:txBody>
+            <a:bodyPr rtlCol="0" anchor="ctr"/>
+            <a:lstStyle/>
+            <a:p>
+              <a:pPr algn="ctr"/>
+              <a:r>
+                <a:rPr lang="zh-CN" altLang="en-US" sz="900" smtClean="0"/>
+                <a:t>应用层请求发送数据</a:t>
+              </a:r>
+              <a:endParaRPr lang="zh-CN" altLang="en-US" sz="900"/>
+            </a:p>
+          </p:txBody>
+        </p:sp>
+        <p:sp>
+          <p:nvSpPr>
+            <p:cNvPr id="5" name="流程图: 决策 4"/>
+            <p:cNvSpPr/>
+            <p:nvPr/>
+          </p:nvSpPr>
+          <p:spPr>
+            <a:xfrm>
+              <a:off x="1494277" y="2022258"/>
+              <a:ext cx="1333159" cy="439872"/>
+            </a:xfrm>
+            <a:prstGeom prst="flowChartDecision">
+              <a:avLst/>
+            </a:prstGeom>
+          </p:spPr>
+          <p:style>
+            <a:lnRef idx="2">
+              <a:schemeClr val="dk1"/>
+            </a:lnRef>
+            <a:fillRef idx="1">
+              <a:schemeClr val="lt1"/>
+            </a:fillRef>
+            <a:effectRef idx="0">
+              <a:schemeClr val="dk1"/>
+            </a:effectRef>
+            <a:fontRef idx="minor">
+              <a:schemeClr val="dk1"/>
+            </a:fontRef>
+          </p:style>
+          <p:txBody>
+            <a:bodyPr rtlCol="0" anchor="ctr"/>
+            <a:lstStyle/>
+            <a:p>
+              <a:pPr algn="ctr"/>
+              <a:r>
+                <a:rPr lang="zh-CN" altLang="en-US" sz="900" smtClean="0"/>
+                <a:t>窗口已满？</a:t>
+              </a:r>
+              <a:endParaRPr lang="zh-CN" altLang="en-US" sz="900"/>
+            </a:p>
+          </p:txBody>
+        </p:sp>
+        <p:cxnSp>
+          <p:nvCxnSpPr>
+            <p:cNvPr id="6" name="直接箭头连接符 5"/>
+            <p:cNvCxnSpPr>
+              <a:stCxn id="4" idx="2"/>
+              <a:endCxn id="5" idx="0"/>
+            </p:cNvCxnSpPr>
+            <p:nvPr/>
+          </p:nvCxnSpPr>
+          <p:spPr>
+            <a:xfrm>
+              <a:off x="2160857" y="1787932"/>
+              <a:ext cx="0" cy="234326"/>
+            </a:xfrm>
+            <a:prstGeom prst="straightConnector1">
+              <a:avLst/>
+            </a:prstGeom>
+            <a:ln>
+              <a:tailEnd type="triangle"/>
+            </a:ln>
+          </p:spPr>
+          <p:style>
+            <a:lnRef idx="2">
+              <a:schemeClr val="dk1"/>
+            </a:lnRef>
+            <a:fillRef idx="0">
+              <a:schemeClr val="dk1"/>
+            </a:fillRef>
+            <a:effectRef idx="1">
+              <a:schemeClr val="dk1"/>
+            </a:effectRef>
+            <a:fontRef idx="minor">
+              <a:schemeClr val="tx1"/>
+            </a:fontRef>
+          </p:style>
+        </p:cxnSp>
+        <p:sp>
+          <p:nvSpPr>
+            <p:cNvPr id="9" name="矩形 8"/>
+            <p:cNvSpPr/>
+            <p:nvPr/>
+          </p:nvSpPr>
+          <p:spPr>
+            <a:xfrm>
+              <a:off x="524709" y="2660530"/>
+              <a:ext cx="730512" cy="238898"/>
+            </a:xfrm>
+            <a:prstGeom prst="rect">
+              <a:avLst/>
+            </a:prstGeom>
+          </p:spPr>
+          <p:style>
+            <a:lnRef idx="2">
+              <a:schemeClr val="dk1"/>
+            </a:lnRef>
+            <a:fillRef idx="1">
+              <a:schemeClr val="lt1"/>
+            </a:fillRef>
+            <a:effectRef idx="0">
+              <a:schemeClr val="dk1"/>
+            </a:effectRef>
+            <a:fontRef idx="minor">
+              <a:schemeClr val="dk1"/>
+            </a:fontRef>
+          </p:style>
+          <p:txBody>
+            <a:bodyPr rtlCol="0" anchor="ctr"/>
+            <a:lstStyle/>
+            <a:p>
+              <a:pPr algn="ctr"/>
+              <a:r>
+                <a:rPr lang="zh-CN" altLang="en-US" sz="900" smtClean="0"/>
+                <a:t>拒绝发送</a:t>
+              </a:r>
+              <a:endParaRPr lang="zh-CN" altLang="en-US" sz="900"/>
+            </a:p>
+          </p:txBody>
+        </p:sp>
+        <p:cxnSp>
+          <p:nvCxnSpPr>
+            <p:cNvPr id="10" name="肘形连接符 9"/>
+            <p:cNvCxnSpPr>
+              <a:stCxn id="5" idx="1"/>
+            </p:cNvCxnSpPr>
+            <p:nvPr/>
+          </p:nvCxnSpPr>
+          <p:spPr>
+            <a:xfrm rot="10800000" flipV="1">
+              <a:off x="889965" y="2242194"/>
+              <a:ext cx="604312" cy="418336"/>
+            </a:xfrm>
+            <a:prstGeom prst="bentConnector2">
+              <a:avLst/>
+            </a:prstGeom>
+            <a:ln>
+              <a:tailEnd type="triangle"/>
+            </a:ln>
+          </p:spPr>
+          <p:style>
+            <a:lnRef idx="2">
+              <a:schemeClr val="dk1"/>
+            </a:lnRef>
+            <a:fillRef idx="0">
+              <a:schemeClr val="dk1"/>
+            </a:fillRef>
+            <a:effectRef idx="1">
+              <a:schemeClr val="dk1"/>
+            </a:effectRef>
+            <a:fontRef idx="minor">
+              <a:schemeClr val="tx1"/>
+            </a:fontRef>
+          </p:style>
+        </p:cxnSp>
+        <p:sp>
+          <p:nvSpPr>
+            <p:cNvPr id="13" name="文本框 12"/>
+            <p:cNvSpPr txBox="1"/>
+            <p:nvPr/>
+          </p:nvSpPr>
+          <p:spPr>
+            <a:xfrm>
+              <a:off x="1255221" y="2016810"/>
+              <a:ext cx="343364" cy="230832"/>
+            </a:xfrm>
+            <a:prstGeom prst="rect">
+              <a:avLst/>
+            </a:prstGeom>
+            <a:noFill/>
+          </p:spPr>
+          <p:txBody>
+            <a:bodyPr wrap="none" rtlCol="0">
+              <a:spAutoFit/>
+            </a:bodyPr>
+            <a:lstStyle/>
+            <a:p>
+              <a:r>
+                <a:rPr lang="en-US" altLang="zh-CN" sz="900" smtClean="0"/>
+                <a:t>Yes</a:t>
+              </a:r>
+              <a:endParaRPr lang="zh-CN" altLang="en-US" sz="900"/>
+            </a:p>
+          </p:txBody>
+        </p:sp>
+        <p:sp>
+          <p:nvSpPr>
+            <p:cNvPr id="14" name="文本框 13"/>
+            <p:cNvSpPr txBox="1"/>
+            <p:nvPr/>
+          </p:nvSpPr>
+          <p:spPr>
+            <a:xfrm>
+              <a:off x="2160856" y="2429698"/>
+              <a:ext cx="319318" cy="230832"/>
+            </a:xfrm>
+            <a:prstGeom prst="rect">
+              <a:avLst/>
+            </a:prstGeom>
+            <a:noFill/>
+          </p:spPr>
+          <p:txBody>
+            <a:bodyPr wrap="none" rtlCol="0">
+              <a:spAutoFit/>
+            </a:bodyPr>
+            <a:lstStyle/>
+            <a:p>
+              <a:r>
+                <a:rPr lang="en-US" altLang="zh-CN" sz="900" smtClean="0"/>
+                <a:t>No</a:t>
+              </a:r>
+              <a:endParaRPr lang="zh-CN" altLang="en-US" sz="900"/>
+            </a:p>
+          </p:txBody>
+        </p:sp>
+        <p:sp>
+          <p:nvSpPr>
+            <p:cNvPr id="15" name="矩形 14"/>
+            <p:cNvSpPr/>
+            <p:nvPr/>
+          </p:nvSpPr>
+          <p:spPr>
+            <a:xfrm>
+              <a:off x="1463402" y="2779979"/>
+              <a:ext cx="1394907" cy="342652"/>
+            </a:xfrm>
+            <a:prstGeom prst="rect">
+              <a:avLst/>
+            </a:prstGeom>
+          </p:spPr>
+          <p:style>
+            <a:lnRef idx="2">
+              <a:schemeClr val="dk1"/>
+            </a:lnRef>
+            <a:fillRef idx="1">
+              <a:schemeClr val="lt1"/>
+            </a:fillRef>
+            <a:effectRef idx="0">
+              <a:schemeClr val="dk1"/>
+            </a:effectRef>
+            <a:fontRef idx="minor">
+              <a:schemeClr val="dk1"/>
+            </a:fontRef>
+          </p:style>
+          <p:txBody>
+            <a:bodyPr rtlCol="0" anchor="ctr"/>
+            <a:lstStyle/>
+            <a:p>
+              <a:pPr algn="ctr"/>
+              <a:r>
+                <a:rPr lang="zh-CN" altLang="en-US" sz="900" smtClean="0"/>
+                <a:t>将当前数据做成数据包，</a:t>
+              </a:r>
+              <a:endParaRPr lang="en-US" altLang="zh-CN" sz="900" smtClean="0"/>
+            </a:p>
+            <a:p>
+              <a:pPr algn="ctr"/>
+              <a:r>
+                <a:rPr lang="zh-CN" altLang="en-US" sz="900" smtClean="0"/>
+                <a:t>并编上序号放入窗口</a:t>
+              </a:r>
+              <a:endParaRPr lang="zh-CN" altLang="en-US" sz="900"/>
+            </a:p>
+          </p:txBody>
+        </p:sp>
+        <p:cxnSp>
+          <p:nvCxnSpPr>
+            <p:cNvPr id="16" name="直接箭头连接符 15"/>
+            <p:cNvCxnSpPr>
+              <a:stCxn id="5" idx="2"/>
+              <a:endCxn id="15" idx="0"/>
+            </p:cNvCxnSpPr>
+            <p:nvPr/>
+          </p:nvCxnSpPr>
+          <p:spPr>
+            <a:xfrm flipH="1">
+              <a:off x="2160856" y="2462130"/>
+              <a:ext cx="1" cy="317849"/>
+            </a:xfrm>
+            <a:prstGeom prst="straightConnector1">
+              <a:avLst/>
+            </a:prstGeom>
+            <a:ln>
+              <a:tailEnd type="triangle"/>
+            </a:ln>
+          </p:spPr>
+          <p:style>
+            <a:lnRef idx="2">
+              <a:schemeClr val="dk1"/>
+            </a:lnRef>
+            <a:fillRef idx="0">
+              <a:schemeClr val="dk1"/>
+            </a:fillRef>
+            <a:effectRef idx="1">
+              <a:schemeClr val="dk1"/>
+            </a:effectRef>
+            <a:fontRef idx="minor">
+              <a:schemeClr val="tx1"/>
+            </a:fontRef>
+          </p:style>
+        </p:cxnSp>
+        <p:sp>
+          <p:nvSpPr>
+            <p:cNvPr id="19" name="矩形 18"/>
+            <p:cNvSpPr/>
+            <p:nvPr/>
+          </p:nvSpPr>
+          <p:spPr>
+            <a:xfrm>
+              <a:off x="1519873" y="3364073"/>
+              <a:ext cx="1281964" cy="288504"/>
+            </a:xfrm>
+            <a:prstGeom prst="rect">
+              <a:avLst/>
+            </a:prstGeom>
+          </p:spPr>
+          <p:style>
+            <a:lnRef idx="2">
+              <a:schemeClr val="dk1"/>
+            </a:lnRef>
+            <a:fillRef idx="1">
+              <a:schemeClr val="lt1"/>
+            </a:fillRef>
+            <a:effectRef idx="0">
+              <a:schemeClr val="dk1"/>
+            </a:effectRef>
+            <a:fontRef idx="minor">
+              <a:schemeClr val="dk1"/>
+            </a:fontRef>
+          </p:style>
+          <p:txBody>
+            <a:bodyPr rtlCol="0" anchor="ctr"/>
+            <a:lstStyle/>
+            <a:p>
+              <a:pPr algn="ctr"/>
+              <a:r>
+                <a:rPr lang="zh-CN" altLang="en-US" sz="900" smtClean="0"/>
+                <a:t>向网络层发送数据包</a:t>
+              </a:r>
+              <a:endParaRPr lang="zh-CN" altLang="en-US" sz="900"/>
+            </a:p>
+          </p:txBody>
+        </p:sp>
+        <p:cxnSp>
+          <p:nvCxnSpPr>
+            <p:cNvPr id="20" name="直接箭头连接符 19"/>
+            <p:cNvCxnSpPr>
+              <a:stCxn id="15" idx="2"/>
+              <a:endCxn id="19" idx="0"/>
+            </p:cNvCxnSpPr>
+            <p:nvPr/>
+          </p:nvCxnSpPr>
+          <p:spPr>
+            <a:xfrm flipH="1">
+              <a:off x="2160855" y="3122631"/>
+              <a:ext cx="1" cy="241442"/>
+            </a:xfrm>
+            <a:prstGeom prst="straightConnector1">
+              <a:avLst/>
+            </a:prstGeom>
+            <a:ln>
+              <a:tailEnd type="triangle"/>
+            </a:ln>
+          </p:spPr>
+          <p:style>
+            <a:lnRef idx="2">
+              <a:schemeClr val="dk1"/>
+            </a:lnRef>
+            <a:fillRef idx="0">
+              <a:schemeClr val="dk1"/>
+            </a:fillRef>
+            <a:effectRef idx="1">
+              <a:schemeClr val="dk1"/>
+            </a:effectRef>
+            <a:fontRef idx="minor">
+              <a:schemeClr val="tx1"/>
+            </a:fontRef>
+          </p:style>
+        </p:cxnSp>
+        <p:sp>
+          <p:nvSpPr>
+            <p:cNvPr id="23" name="矩形 22"/>
+            <p:cNvSpPr/>
+            <p:nvPr/>
+          </p:nvSpPr>
+          <p:spPr>
+            <a:xfrm>
+              <a:off x="1715670" y="3894018"/>
+              <a:ext cx="890370" cy="327461"/>
+            </a:xfrm>
+            <a:prstGeom prst="rect">
+              <a:avLst/>
+            </a:prstGeom>
+          </p:spPr>
+          <p:style>
+            <a:lnRef idx="2">
+              <a:schemeClr val="dk1"/>
+            </a:lnRef>
+            <a:fillRef idx="1">
+              <a:schemeClr val="lt1"/>
+            </a:fillRef>
+            <a:effectRef idx="0">
+              <a:schemeClr val="dk1"/>
+            </a:effectRef>
+            <a:fontRef idx="minor">
+              <a:schemeClr val="dk1"/>
+            </a:fontRef>
+          </p:style>
+          <p:txBody>
+            <a:bodyPr rtlCol="0" anchor="ctr"/>
+            <a:lstStyle/>
+            <a:p>
+              <a:pPr algn="ctr"/>
+              <a:r>
+                <a:rPr lang="zh-CN" altLang="en-US" sz="900" smtClean="0"/>
+                <a:t>启动对该数据包的定时器</a:t>
+              </a:r>
+              <a:endParaRPr lang="zh-CN" altLang="en-US" sz="900"/>
+            </a:p>
+          </p:txBody>
+        </p:sp>
+        <p:cxnSp>
+          <p:nvCxnSpPr>
+            <p:cNvPr id="24" name="直接箭头连接符 23"/>
+            <p:cNvCxnSpPr>
+              <a:stCxn id="19" idx="2"/>
+              <a:endCxn id="23" idx="0"/>
+            </p:cNvCxnSpPr>
+            <p:nvPr/>
+          </p:nvCxnSpPr>
+          <p:spPr>
+            <a:xfrm>
+              <a:off x="2160855" y="3652577"/>
+              <a:ext cx="0" cy="241442"/>
+            </a:xfrm>
+            <a:prstGeom prst="straightConnector1">
+              <a:avLst/>
+            </a:prstGeom>
+            <a:ln>
+              <a:tailEnd type="triangle"/>
+            </a:ln>
+          </p:spPr>
+          <p:style>
+            <a:lnRef idx="2">
+              <a:schemeClr val="dk1"/>
+            </a:lnRef>
+            <a:fillRef idx="0">
+              <a:schemeClr val="dk1"/>
+            </a:fillRef>
+            <a:effectRef idx="1">
+              <a:schemeClr val="dk1"/>
+            </a:effectRef>
+            <a:fontRef idx="minor">
+              <a:schemeClr val="tx1"/>
+            </a:fontRef>
+          </p:style>
+        </p:cxnSp>
+        <p:sp>
+          <p:nvSpPr>
+            <p:cNvPr id="27" name="椭圆 26"/>
+            <p:cNvSpPr/>
+            <p:nvPr/>
+          </p:nvSpPr>
+          <p:spPr>
+            <a:xfrm>
+              <a:off x="3682539" y="654186"/>
+              <a:ext cx="939338" cy="432538"/>
+            </a:xfrm>
+            <a:prstGeom prst="ellipse">
+              <a:avLst/>
+            </a:prstGeom>
+          </p:spPr>
+          <p:style>
+            <a:lnRef idx="2">
+              <a:schemeClr val="dk1"/>
+            </a:lnRef>
+            <a:fillRef idx="1">
+              <a:schemeClr val="lt1"/>
+            </a:fillRef>
+            <a:effectRef idx="0">
+              <a:schemeClr val="dk1"/>
+            </a:effectRef>
+            <a:fontRef idx="minor">
+              <a:schemeClr val="dk1"/>
+            </a:fontRef>
+          </p:style>
+          <p:txBody>
+            <a:bodyPr rtlCol="0" anchor="ctr"/>
+            <a:lstStyle/>
+            <a:p>
+              <a:pPr algn="ctr"/>
+              <a:r>
+                <a:rPr lang="zh-CN" altLang="en-US" sz="900" smtClean="0"/>
+                <a:t>发送方</a:t>
+              </a:r>
+              <a:endParaRPr lang="en-US" altLang="zh-CN" sz="900" smtClean="0"/>
+            </a:p>
+            <a:p>
+              <a:pPr algn="ctr"/>
+              <a:r>
+                <a:rPr lang="zh-CN" altLang="en-US" sz="900" smtClean="0"/>
+                <a:t>等待数据</a:t>
+              </a:r>
+              <a:endParaRPr lang="zh-CN" altLang="en-US" sz="900"/>
+            </a:p>
+          </p:txBody>
+        </p:sp>
+        <p:cxnSp>
+          <p:nvCxnSpPr>
+            <p:cNvPr id="28" name="肘形连接符 27"/>
+            <p:cNvCxnSpPr>
+              <a:stCxn id="27" idx="4"/>
+              <a:endCxn id="4" idx="0"/>
+            </p:cNvCxnSpPr>
+            <p:nvPr/>
+          </p:nvCxnSpPr>
+          <p:spPr>
+            <a:xfrm rot="5400000">
+              <a:off x="2925378" y="322204"/>
+              <a:ext cx="462310" cy="1991351"/>
+            </a:xfrm>
+            <a:prstGeom prst="bentConnector3">
+              <a:avLst>
+                <a:gd name="adj1" fmla="val 50000"/>
+              </a:avLst>
+            </a:prstGeom>
+            <a:ln>
+              <a:tailEnd type="triangle"/>
+            </a:ln>
+          </p:spPr>
+          <p:style>
+            <a:lnRef idx="2">
+              <a:schemeClr val="dk1"/>
+            </a:lnRef>
+            <a:fillRef idx="0">
+              <a:schemeClr val="dk1"/>
+            </a:fillRef>
+            <a:effectRef idx="1">
+              <a:schemeClr val="dk1"/>
+            </a:effectRef>
+            <a:fontRef idx="minor">
+              <a:schemeClr val="tx1"/>
+            </a:fontRef>
+          </p:style>
+        </p:cxnSp>
+        <p:cxnSp>
+          <p:nvCxnSpPr>
+            <p:cNvPr id="31" name="肘形连接符 30"/>
+            <p:cNvCxnSpPr>
+              <a:endCxn id="27" idx="0"/>
+            </p:cNvCxnSpPr>
+            <p:nvPr/>
+          </p:nvCxnSpPr>
+          <p:spPr>
+            <a:xfrm rot="5400000" flipH="1" flipV="1">
+              <a:off x="102804" y="978410"/>
+              <a:ext cx="4373628" cy="3725180"/>
+            </a:xfrm>
+            <a:prstGeom prst="bentConnector3">
+              <a:avLst>
+                <a:gd name="adj1" fmla="val 105227"/>
+              </a:avLst>
+            </a:prstGeom>
+            <a:ln>
+              <a:tailEnd type="triangle"/>
+            </a:ln>
+          </p:spPr>
+          <p:style>
+            <a:lnRef idx="2">
+              <a:schemeClr val="dk1"/>
+            </a:lnRef>
+            <a:fillRef idx="0">
+              <a:schemeClr val="dk1"/>
+            </a:fillRef>
+            <a:effectRef idx="1">
+              <a:schemeClr val="dk1"/>
+            </a:effectRef>
+            <a:fontRef idx="minor">
+              <a:schemeClr val="tx1"/>
+            </a:fontRef>
+          </p:style>
+        </p:cxnSp>
+        <p:sp>
+          <p:nvSpPr>
+            <p:cNvPr id="39" name="圆角矩形 38"/>
+            <p:cNvSpPr/>
+            <p:nvPr/>
+          </p:nvSpPr>
+          <p:spPr>
+            <a:xfrm>
+              <a:off x="3535803" y="1549034"/>
+              <a:ext cx="1232812" cy="238898"/>
+            </a:xfrm>
+            <a:prstGeom prst="roundRect">
+              <a:avLst/>
+            </a:prstGeom>
+          </p:spPr>
+          <p:style>
+            <a:lnRef idx="2">
+              <a:schemeClr val="dk1"/>
+            </a:lnRef>
+            <a:fillRef idx="1">
+              <a:schemeClr val="lt1"/>
+            </a:fillRef>
+            <a:effectRef idx="0">
+              <a:schemeClr val="dk1"/>
+            </a:effectRef>
+            <a:fontRef idx="minor">
+              <a:schemeClr val="dk1"/>
+            </a:fontRef>
+          </p:style>
+          <p:txBody>
+            <a:bodyPr rtlCol="0" anchor="ctr"/>
+            <a:lstStyle/>
+            <a:p>
+              <a:pPr algn="ctr"/>
+              <a:r>
+                <a:rPr lang="zh-CN" altLang="en-US" sz="900" smtClean="0"/>
+                <a:t>网络层发来数据包</a:t>
+              </a:r>
+              <a:endParaRPr lang="zh-CN" altLang="en-US" sz="900"/>
+            </a:p>
+          </p:txBody>
+        </p:sp>
+        <p:cxnSp>
+          <p:nvCxnSpPr>
+            <p:cNvPr id="40" name="直接箭头连接符 39"/>
+            <p:cNvCxnSpPr>
+              <a:stCxn id="27" idx="4"/>
+              <a:endCxn id="39" idx="0"/>
+            </p:cNvCxnSpPr>
+            <p:nvPr/>
+          </p:nvCxnSpPr>
+          <p:spPr>
+            <a:xfrm>
+              <a:off x="4152208" y="1086724"/>
+              <a:ext cx="1" cy="462310"/>
+            </a:xfrm>
+            <a:prstGeom prst="straightConnector1">
+              <a:avLst/>
+            </a:prstGeom>
+            <a:ln>
+              <a:tailEnd type="triangle"/>
+            </a:ln>
+          </p:spPr>
+          <p:style>
+            <a:lnRef idx="2">
+              <a:schemeClr val="dk1"/>
+            </a:lnRef>
+            <a:fillRef idx="0">
+              <a:schemeClr val="dk1"/>
+            </a:fillRef>
+            <a:effectRef idx="1">
+              <a:schemeClr val="dk1"/>
+            </a:effectRef>
+            <a:fontRef idx="minor">
+              <a:schemeClr val="tx1"/>
+            </a:fontRef>
+          </p:style>
+        </p:cxnSp>
+        <p:cxnSp>
+          <p:nvCxnSpPr>
+            <p:cNvPr id="49" name="直接箭头连接符 48"/>
+            <p:cNvCxnSpPr/>
+            <p:nvPr/>
+          </p:nvCxnSpPr>
+          <p:spPr>
+            <a:xfrm flipH="1">
+              <a:off x="889964" y="2899428"/>
+              <a:ext cx="3" cy="2128386"/>
+            </a:xfrm>
+            <a:prstGeom prst="straightConnector1">
+              <a:avLst/>
+            </a:prstGeom>
+            <a:ln>
+              <a:tailEnd type="triangle"/>
+            </a:ln>
+          </p:spPr>
+          <p:style>
+            <a:lnRef idx="2">
+              <a:schemeClr val="dk1"/>
+            </a:lnRef>
+            <a:fillRef idx="0">
+              <a:schemeClr val="dk1"/>
+            </a:fillRef>
+            <a:effectRef idx="1">
+              <a:schemeClr val="dk1"/>
+            </a:effectRef>
+            <a:fontRef idx="minor">
+              <a:schemeClr val="tx1"/>
+            </a:fontRef>
+          </p:style>
+        </p:cxnSp>
+        <p:cxnSp>
+          <p:nvCxnSpPr>
+            <p:cNvPr id="53" name="直接连接符 52"/>
+            <p:cNvCxnSpPr/>
+            <p:nvPr/>
+          </p:nvCxnSpPr>
+          <p:spPr>
+            <a:xfrm>
+              <a:off x="427028" y="5027814"/>
+              <a:ext cx="5412773" cy="0"/>
+            </a:xfrm>
+            <a:prstGeom prst="line">
+              <a:avLst/>
+            </a:prstGeom>
+          </p:spPr>
+          <p:style>
+            <a:lnRef idx="2">
+              <a:schemeClr val="dk1"/>
+            </a:lnRef>
+            <a:fillRef idx="0">
+              <a:schemeClr val="dk1"/>
+            </a:fillRef>
+            <a:effectRef idx="1">
+              <a:schemeClr val="dk1"/>
+            </a:effectRef>
+            <a:fontRef idx="minor">
+              <a:schemeClr val="tx1"/>
+            </a:fontRef>
+          </p:style>
+        </p:cxnSp>
+        <p:cxnSp>
+          <p:nvCxnSpPr>
+            <p:cNvPr id="55" name="直接箭头连接符 54"/>
+            <p:cNvCxnSpPr>
+              <a:stCxn id="23" idx="2"/>
+            </p:cNvCxnSpPr>
+            <p:nvPr/>
+          </p:nvCxnSpPr>
+          <p:spPr>
+            <a:xfrm>
+              <a:off x="2160855" y="4221479"/>
+              <a:ext cx="0" cy="806335"/>
+            </a:xfrm>
+            <a:prstGeom prst="straightConnector1">
+              <a:avLst/>
+            </a:prstGeom>
+            <a:ln>
+              <a:tailEnd type="triangle"/>
+            </a:ln>
+          </p:spPr>
+          <p:style>
+            <a:lnRef idx="2">
+              <a:schemeClr val="dk1"/>
+            </a:lnRef>
+            <a:fillRef idx="0">
+              <a:schemeClr val="dk1"/>
+            </a:fillRef>
+            <a:effectRef idx="1">
+              <a:schemeClr val="dk1"/>
+            </a:effectRef>
+            <a:fontRef idx="minor">
+              <a:schemeClr val="tx1"/>
+            </a:fontRef>
+          </p:style>
+        </p:cxnSp>
+        <p:sp>
+          <p:nvSpPr>
+            <p:cNvPr id="60" name="流程图: 决策 59"/>
+            <p:cNvSpPr/>
+            <p:nvPr/>
+          </p:nvSpPr>
+          <p:spPr>
+            <a:xfrm>
+              <a:off x="3583224" y="2030306"/>
+              <a:ext cx="1136753" cy="439872"/>
+            </a:xfrm>
+            <a:prstGeom prst="flowChartDecision">
+              <a:avLst/>
+            </a:prstGeom>
+          </p:spPr>
+          <p:style>
+            <a:lnRef idx="2">
+              <a:schemeClr val="dk1"/>
+            </a:lnRef>
+            <a:fillRef idx="1">
+              <a:schemeClr val="lt1"/>
+            </a:fillRef>
+            <a:effectRef idx="0">
+              <a:schemeClr val="dk1"/>
+            </a:effectRef>
+            <a:fontRef idx="minor">
+              <a:schemeClr val="dk1"/>
+            </a:fontRef>
+          </p:style>
+          <p:txBody>
+            <a:bodyPr rtlCol="0" anchor="ctr"/>
+            <a:lstStyle/>
+            <a:p>
+              <a:pPr algn="ctr"/>
+              <a:r>
+                <a:rPr lang="zh-CN" altLang="en-US" sz="900" smtClean="0"/>
+                <a:t>数据包</a:t>
+              </a:r>
+              <a:endParaRPr lang="en-US" altLang="zh-CN" sz="900" smtClean="0"/>
+            </a:p>
+            <a:p>
+              <a:pPr algn="ctr"/>
+              <a:r>
+                <a:rPr lang="zh-CN" altLang="en-US" sz="900" smtClean="0"/>
+                <a:t>完好？</a:t>
+              </a:r>
+              <a:endParaRPr lang="zh-CN" altLang="en-US" sz="900"/>
+            </a:p>
+          </p:txBody>
+        </p:sp>
+        <p:cxnSp>
+          <p:nvCxnSpPr>
+            <p:cNvPr id="61" name="直接箭头连接符 60"/>
+            <p:cNvCxnSpPr>
+              <a:stCxn id="39" idx="2"/>
+              <a:endCxn id="60" idx="0"/>
+            </p:cNvCxnSpPr>
+            <p:nvPr/>
+          </p:nvCxnSpPr>
+          <p:spPr>
+            <a:xfrm flipH="1">
+              <a:off x="4151601" y="1787932"/>
+              <a:ext cx="608" cy="242374"/>
+            </a:xfrm>
+            <a:prstGeom prst="straightConnector1">
+              <a:avLst/>
+            </a:prstGeom>
+            <a:ln>
+              <a:tailEnd type="triangle"/>
+            </a:ln>
+          </p:spPr>
+          <p:style>
+            <a:lnRef idx="2">
+              <a:schemeClr val="dk1"/>
+            </a:lnRef>
+            <a:fillRef idx="0">
+              <a:schemeClr val="dk1"/>
+            </a:fillRef>
+            <a:effectRef idx="1">
+              <a:schemeClr val="dk1"/>
+            </a:effectRef>
+            <a:fontRef idx="minor">
+              <a:schemeClr val="tx1"/>
+            </a:fontRef>
+          </p:style>
+        </p:cxnSp>
+        <p:cxnSp>
+          <p:nvCxnSpPr>
+            <p:cNvPr id="66" name="肘形连接符 65"/>
+            <p:cNvCxnSpPr>
+              <a:stCxn id="60" idx="1"/>
+            </p:cNvCxnSpPr>
+            <p:nvPr/>
+          </p:nvCxnSpPr>
+          <p:spPr>
+            <a:xfrm rot="10800000" flipV="1">
+              <a:off x="3066490" y="2250241"/>
+              <a:ext cx="516734" cy="2777571"/>
+            </a:xfrm>
+            <a:prstGeom prst="bentConnector2">
+              <a:avLst/>
+            </a:prstGeom>
+            <a:ln>
+              <a:tailEnd type="triangle"/>
+            </a:ln>
+          </p:spPr>
+          <p:style>
+            <a:lnRef idx="2">
+              <a:schemeClr val="dk1"/>
+            </a:lnRef>
+            <a:fillRef idx="0">
+              <a:schemeClr val="dk1"/>
+            </a:fillRef>
+            <a:effectRef idx="1">
+              <a:schemeClr val="dk1"/>
+            </a:effectRef>
+            <a:fontRef idx="minor">
+              <a:schemeClr val="tx1"/>
+            </a:fontRef>
+          </p:style>
+        </p:cxnSp>
+        <p:sp>
+          <p:nvSpPr>
+            <p:cNvPr id="69" name="文本框 68"/>
+            <p:cNvSpPr txBox="1"/>
+            <p:nvPr/>
+          </p:nvSpPr>
+          <p:spPr>
+            <a:xfrm>
+              <a:off x="3351573" y="2024858"/>
+              <a:ext cx="319318" cy="230832"/>
+            </a:xfrm>
+            <a:prstGeom prst="rect">
+              <a:avLst/>
+            </a:prstGeom>
+            <a:noFill/>
+          </p:spPr>
+          <p:txBody>
+            <a:bodyPr wrap="none" rtlCol="0">
+              <a:spAutoFit/>
+            </a:bodyPr>
+            <a:lstStyle/>
+            <a:p>
+              <a:r>
+                <a:rPr lang="en-US" altLang="zh-CN" sz="900" smtClean="0"/>
+                <a:t>No</a:t>
+              </a:r>
+              <a:endParaRPr lang="zh-CN" altLang="en-US" sz="900"/>
+            </a:p>
+          </p:txBody>
+        </p:sp>
+        <p:sp>
+          <p:nvSpPr>
+            <p:cNvPr id="71" name="流程图: 决策 70"/>
+            <p:cNvSpPr/>
+            <p:nvPr/>
+          </p:nvSpPr>
+          <p:spPr>
+            <a:xfrm>
+              <a:off x="3277923" y="2682780"/>
+              <a:ext cx="1747353" cy="455204"/>
+            </a:xfrm>
+            <a:prstGeom prst="flowChartDecision">
+              <a:avLst/>
+            </a:prstGeom>
+          </p:spPr>
+          <p:style>
+            <a:lnRef idx="2">
+              <a:schemeClr val="dk1"/>
+            </a:lnRef>
+            <a:fillRef idx="1">
+              <a:schemeClr val="lt1"/>
+            </a:fillRef>
+            <a:effectRef idx="0">
+              <a:schemeClr val="dk1"/>
+            </a:effectRef>
+            <a:fontRef idx="minor">
+              <a:schemeClr val="dk1"/>
+            </a:fontRef>
+          </p:style>
+          <p:txBody>
+            <a:bodyPr rtlCol="0" anchor="ctr"/>
+            <a:lstStyle/>
+            <a:p>
+              <a:pPr algn="ctr"/>
+              <a:r>
+                <a:rPr lang="zh-CN" altLang="en-US" sz="900" smtClean="0"/>
+                <a:t>该</a:t>
+              </a:r>
+              <a:r>
+                <a:rPr lang="zh-CN" altLang="en-US" sz="900" smtClean="0"/>
+                <a:t>包的序号在发送窗口中？</a:t>
+              </a:r>
+              <a:endParaRPr lang="zh-CN" altLang="en-US" sz="900"/>
+            </a:p>
+          </p:txBody>
+        </p:sp>
+        <p:cxnSp>
+          <p:nvCxnSpPr>
+            <p:cNvPr id="73" name="肘形连接符 72"/>
+            <p:cNvCxnSpPr>
+              <a:stCxn id="71" idx="1"/>
+            </p:cNvCxnSpPr>
+            <p:nvPr/>
+          </p:nvCxnSpPr>
+          <p:spPr>
+            <a:xfrm rot="10800000" flipV="1">
+              <a:off x="3066491" y="2910382"/>
+              <a:ext cx="211433" cy="2117432"/>
+            </a:xfrm>
+            <a:prstGeom prst="bentConnector2">
+              <a:avLst/>
+            </a:prstGeom>
+            <a:ln>
+              <a:tailEnd type="triangle"/>
+            </a:ln>
+          </p:spPr>
+          <p:style>
+            <a:lnRef idx="2">
+              <a:schemeClr val="dk1"/>
+            </a:lnRef>
+            <a:fillRef idx="0">
+              <a:schemeClr val="dk1"/>
+            </a:fillRef>
+            <a:effectRef idx="1">
+              <a:schemeClr val="dk1"/>
+            </a:effectRef>
+            <a:fontRef idx="minor">
+              <a:schemeClr val="tx1"/>
+            </a:fontRef>
+          </p:style>
+        </p:cxnSp>
+        <p:sp>
+          <p:nvSpPr>
+            <p:cNvPr id="76" name="文本框 75"/>
+            <p:cNvSpPr txBox="1"/>
+            <p:nvPr/>
+          </p:nvSpPr>
+          <p:spPr>
+            <a:xfrm>
+              <a:off x="3066490" y="2699590"/>
+              <a:ext cx="319318" cy="230832"/>
+            </a:xfrm>
+            <a:prstGeom prst="rect">
+              <a:avLst/>
+            </a:prstGeom>
+            <a:noFill/>
+          </p:spPr>
+          <p:txBody>
+            <a:bodyPr wrap="none" rtlCol="0">
+              <a:spAutoFit/>
+            </a:bodyPr>
+            <a:lstStyle/>
+            <a:p>
+              <a:r>
+                <a:rPr lang="en-US" altLang="zh-CN" sz="900" smtClean="0"/>
+                <a:t>No</a:t>
+              </a:r>
+              <a:endParaRPr lang="zh-CN" altLang="en-US" sz="900"/>
+            </a:p>
+          </p:txBody>
+        </p:sp>
+        <p:sp>
+          <p:nvSpPr>
+            <p:cNvPr id="79" name="文本框 78"/>
+            <p:cNvSpPr txBox="1"/>
+            <p:nvPr/>
+          </p:nvSpPr>
+          <p:spPr>
+            <a:xfrm>
+              <a:off x="4202919" y="2449333"/>
+              <a:ext cx="343364" cy="230832"/>
+            </a:xfrm>
+            <a:prstGeom prst="rect">
+              <a:avLst/>
+            </a:prstGeom>
+            <a:noFill/>
+          </p:spPr>
+          <p:txBody>
+            <a:bodyPr wrap="none" rtlCol="0">
+              <a:spAutoFit/>
+            </a:bodyPr>
+            <a:lstStyle/>
+            <a:p>
+              <a:r>
+                <a:rPr lang="en-US" altLang="zh-CN" sz="900" smtClean="0"/>
+                <a:t>Yes</a:t>
+              </a:r>
+              <a:endParaRPr lang="zh-CN" altLang="en-US" sz="900"/>
+            </a:p>
+          </p:txBody>
+        </p:sp>
+        <p:cxnSp>
+          <p:nvCxnSpPr>
+            <p:cNvPr id="80" name="直接箭头连接符 79"/>
+            <p:cNvCxnSpPr>
+              <a:stCxn id="60" idx="2"/>
+              <a:endCxn id="71" idx="0"/>
+            </p:cNvCxnSpPr>
+            <p:nvPr/>
+          </p:nvCxnSpPr>
+          <p:spPr>
+            <a:xfrm flipH="1">
+              <a:off x="4151600" y="2470178"/>
+              <a:ext cx="1" cy="212602"/>
+            </a:xfrm>
+            <a:prstGeom prst="straightConnector1">
+              <a:avLst/>
+            </a:prstGeom>
+            <a:ln>
+              <a:tailEnd type="triangle"/>
+            </a:ln>
+          </p:spPr>
+          <p:style>
+            <a:lnRef idx="2">
+              <a:schemeClr val="dk1"/>
+            </a:lnRef>
+            <a:fillRef idx="0">
+              <a:schemeClr val="dk1"/>
+            </a:fillRef>
+            <a:effectRef idx="1">
+              <a:schemeClr val="dk1"/>
+            </a:effectRef>
+            <a:fontRef idx="minor">
+              <a:schemeClr val="tx1"/>
+            </a:fontRef>
+          </p:style>
+        </p:cxnSp>
+        <p:sp>
+          <p:nvSpPr>
+            <p:cNvPr id="83" name="矩形 82"/>
+            <p:cNvSpPr/>
+            <p:nvPr/>
+          </p:nvSpPr>
+          <p:spPr>
+            <a:xfrm>
+              <a:off x="3799049" y="4492016"/>
+              <a:ext cx="705100" cy="234327"/>
+            </a:xfrm>
+            <a:prstGeom prst="rect">
+              <a:avLst/>
+            </a:prstGeom>
+          </p:spPr>
+          <p:style>
+            <a:lnRef idx="2">
+              <a:schemeClr val="dk1"/>
+            </a:lnRef>
+            <a:fillRef idx="1">
+              <a:schemeClr val="lt1"/>
+            </a:fillRef>
+            <a:effectRef idx="0">
+              <a:schemeClr val="dk1"/>
+            </a:effectRef>
+            <a:fontRef idx="minor">
+              <a:schemeClr val="dk1"/>
+            </a:fontRef>
+          </p:style>
+          <p:txBody>
+            <a:bodyPr rtlCol="0" anchor="ctr"/>
+            <a:lstStyle/>
+            <a:p>
+              <a:pPr algn="ctr"/>
+              <a:r>
+                <a:rPr lang="zh-CN" altLang="en-US" sz="900" smtClean="0"/>
+                <a:t>窗口右规</a:t>
+              </a:r>
+              <a:endParaRPr lang="zh-CN" altLang="en-US" sz="900"/>
+            </a:p>
+          </p:txBody>
+        </p:sp>
+        <p:sp>
+          <p:nvSpPr>
+            <p:cNvPr id="111" name="圆角矩形 110"/>
+            <p:cNvSpPr/>
+            <p:nvPr/>
+          </p:nvSpPr>
+          <p:spPr>
+            <a:xfrm>
+              <a:off x="5427606" y="1549034"/>
+              <a:ext cx="825607" cy="238898"/>
+            </a:xfrm>
+            <a:prstGeom prst="roundRect">
+              <a:avLst/>
+            </a:prstGeom>
+          </p:spPr>
+          <p:style>
+            <a:lnRef idx="2">
+              <a:schemeClr val="dk1"/>
+            </a:lnRef>
+            <a:fillRef idx="1">
+              <a:schemeClr val="lt1"/>
+            </a:fillRef>
+            <a:effectRef idx="0">
+              <a:schemeClr val="dk1"/>
+            </a:effectRef>
+            <a:fontRef idx="minor">
+              <a:schemeClr val="dk1"/>
+            </a:fontRef>
+          </p:style>
+          <p:txBody>
+            <a:bodyPr rtlCol="0" anchor="ctr"/>
+            <a:lstStyle/>
+            <a:p>
+              <a:pPr algn="ctr"/>
+              <a:r>
+                <a:rPr lang="zh-CN" altLang="en-US" sz="900" smtClean="0"/>
+                <a:t>计时器超时</a:t>
+              </a:r>
+              <a:endParaRPr lang="zh-CN" altLang="en-US" sz="900"/>
+            </a:p>
+          </p:txBody>
+        </p:sp>
+        <p:sp>
+          <p:nvSpPr>
+            <p:cNvPr id="112" name="矩形 111"/>
+            <p:cNvSpPr/>
+            <p:nvPr/>
+          </p:nvSpPr>
+          <p:spPr>
+            <a:xfrm>
+              <a:off x="5375266" y="2056350"/>
+              <a:ext cx="930286" cy="361588"/>
+            </a:xfrm>
+            <a:prstGeom prst="rect">
+              <a:avLst/>
+            </a:prstGeom>
+          </p:spPr>
+          <p:style>
+            <a:lnRef idx="2">
+              <a:schemeClr val="dk1"/>
+            </a:lnRef>
+            <a:fillRef idx="1">
+              <a:schemeClr val="lt1"/>
+            </a:fillRef>
+            <a:effectRef idx="0">
+              <a:schemeClr val="dk1"/>
+            </a:effectRef>
+            <a:fontRef idx="minor">
+              <a:schemeClr val="dk1"/>
+            </a:fontRef>
+          </p:style>
+          <p:txBody>
+            <a:bodyPr rtlCol="0" anchor="ctr"/>
+            <a:lstStyle/>
+            <a:p>
+              <a:pPr algn="ctr"/>
+              <a:r>
+                <a:rPr lang="zh-CN" altLang="en-US" sz="900" smtClean="0"/>
+                <a:t>重传发出超时事件的数据包</a:t>
+              </a:r>
+              <a:endParaRPr lang="zh-CN" altLang="en-US" sz="900"/>
+            </a:p>
+          </p:txBody>
+        </p:sp>
+        <p:cxnSp>
+          <p:nvCxnSpPr>
+            <p:cNvPr id="113" name="直接箭头连接符 112"/>
+            <p:cNvCxnSpPr>
+              <a:stCxn id="111" idx="2"/>
+              <a:endCxn id="112" idx="0"/>
+            </p:cNvCxnSpPr>
+            <p:nvPr/>
+          </p:nvCxnSpPr>
+          <p:spPr>
+            <a:xfrm flipH="1">
+              <a:off x="5840409" y="1787932"/>
+              <a:ext cx="1" cy="268418"/>
+            </a:xfrm>
+            <a:prstGeom prst="straightConnector1">
+              <a:avLst/>
+            </a:prstGeom>
+            <a:ln>
+              <a:tailEnd type="triangle"/>
+            </a:ln>
+          </p:spPr>
+          <p:style>
+            <a:lnRef idx="2">
+              <a:schemeClr val="dk1"/>
+            </a:lnRef>
+            <a:fillRef idx="0">
+              <a:schemeClr val="dk1"/>
+            </a:fillRef>
+            <a:effectRef idx="1">
+              <a:schemeClr val="dk1"/>
+            </a:effectRef>
+            <a:fontRef idx="minor">
+              <a:schemeClr val="tx1"/>
+            </a:fontRef>
+          </p:style>
+        </p:cxnSp>
+        <p:cxnSp>
+          <p:nvCxnSpPr>
+            <p:cNvPr id="116" name="肘形连接符 115"/>
+            <p:cNvCxnSpPr>
+              <a:stCxn id="27" idx="4"/>
+              <a:endCxn id="111" idx="0"/>
+            </p:cNvCxnSpPr>
+            <p:nvPr/>
+          </p:nvCxnSpPr>
+          <p:spPr>
+            <a:xfrm rot="16200000" flipH="1">
+              <a:off x="4765154" y="473778"/>
+              <a:ext cx="462310" cy="1688202"/>
+            </a:xfrm>
+            <a:prstGeom prst="bentConnector3">
+              <a:avLst>
+                <a:gd name="adj1" fmla="val 50000"/>
+              </a:avLst>
+            </a:prstGeom>
+            <a:ln>
+              <a:tailEnd type="triangle"/>
+            </a:ln>
+          </p:spPr>
+          <p:style>
+            <a:lnRef idx="2">
+              <a:schemeClr val="dk1"/>
+            </a:lnRef>
+            <a:fillRef idx="0">
+              <a:schemeClr val="dk1"/>
+            </a:fillRef>
+            <a:effectRef idx="1">
+              <a:schemeClr val="dk1"/>
+            </a:effectRef>
+            <a:fontRef idx="minor">
+              <a:schemeClr val="tx1"/>
+            </a:fontRef>
+          </p:style>
+        </p:cxnSp>
+        <p:sp>
+          <p:nvSpPr>
+            <p:cNvPr id="130" name="矩形 129"/>
+            <p:cNvSpPr/>
+            <p:nvPr/>
+          </p:nvSpPr>
+          <p:spPr>
+            <a:xfrm>
+              <a:off x="5455138" y="2652927"/>
+              <a:ext cx="770542" cy="361588"/>
+            </a:xfrm>
+            <a:prstGeom prst="rect">
+              <a:avLst/>
+            </a:prstGeom>
+          </p:spPr>
+          <p:style>
+            <a:lnRef idx="2">
+              <a:schemeClr val="dk1"/>
+            </a:lnRef>
+            <a:fillRef idx="1">
+              <a:schemeClr val="lt1"/>
+            </a:fillRef>
+            <a:effectRef idx="0">
+              <a:schemeClr val="dk1"/>
+            </a:effectRef>
+            <a:fontRef idx="minor">
+              <a:schemeClr val="dk1"/>
+            </a:fontRef>
+          </p:style>
+          <p:txBody>
+            <a:bodyPr rtlCol="0" anchor="ctr"/>
+            <a:lstStyle/>
+            <a:p>
+              <a:pPr algn="ctr"/>
+              <a:r>
+                <a:rPr lang="zh-CN" altLang="en-US" sz="900" smtClean="0"/>
+                <a:t>重</a:t>
+              </a:r>
+              <a:r>
+                <a:rPr lang="zh-CN" altLang="en-US" sz="900" smtClean="0"/>
+                <a:t>启该数据包的定时器</a:t>
+              </a:r>
+              <a:endParaRPr lang="zh-CN" altLang="en-US" sz="900"/>
+            </a:p>
+          </p:txBody>
+        </p:sp>
+        <p:cxnSp>
+          <p:nvCxnSpPr>
+            <p:cNvPr id="131" name="直接箭头连接符 130"/>
+            <p:cNvCxnSpPr>
+              <a:stCxn id="112" idx="2"/>
+              <a:endCxn id="130" idx="0"/>
+            </p:cNvCxnSpPr>
+            <p:nvPr/>
+          </p:nvCxnSpPr>
+          <p:spPr>
+            <a:xfrm>
+              <a:off x="5840409" y="2417938"/>
+              <a:ext cx="0" cy="234989"/>
+            </a:xfrm>
+            <a:prstGeom prst="straightConnector1">
+              <a:avLst/>
+            </a:prstGeom>
+            <a:ln>
+              <a:tailEnd type="triangle"/>
+            </a:ln>
+          </p:spPr>
+          <p:style>
+            <a:lnRef idx="2">
+              <a:schemeClr val="dk1"/>
+            </a:lnRef>
+            <a:fillRef idx="0">
+              <a:schemeClr val="dk1"/>
+            </a:fillRef>
+            <a:effectRef idx="1">
+              <a:schemeClr val="dk1"/>
+            </a:effectRef>
+            <a:fontRef idx="minor">
+              <a:schemeClr val="tx1"/>
+            </a:fontRef>
+          </p:style>
+        </p:cxnSp>
+        <p:cxnSp>
+          <p:nvCxnSpPr>
+            <p:cNvPr id="134" name="直接箭头连接符 133"/>
+            <p:cNvCxnSpPr>
+              <a:stCxn id="130" idx="2"/>
+            </p:cNvCxnSpPr>
+            <p:nvPr/>
+          </p:nvCxnSpPr>
+          <p:spPr>
+            <a:xfrm flipH="1">
+              <a:off x="5839801" y="3014515"/>
+              <a:ext cx="608" cy="2013297"/>
+            </a:xfrm>
+            <a:prstGeom prst="straightConnector1">
+              <a:avLst/>
+            </a:prstGeom>
+            <a:ln>
+              <a:tailEnd type="triangle"/>
+            </a:ln>
+          </p:spPr>
+          <p:style>
+            <a:lnRef idx="2">
+              <a:schemeClr val="dk1"/>
+            </a:lnRef>
+            <a:fillRef idx="0">
+              <a:schemeClr val="dk1"/>
+            </a:fillRef>
+            <a:effectRef idx="1">
+              <a:schemeClr val="dk1"/>
+            </a:effectRef>
+            <a:fontRef idx="minor">
+              <a:schemeClr val="tx1"/>
+            </a:fontRef>
+          </p:style>
+        </p:cxnSp>
+        <p:sp>
+          <p:nvSpPr>
+            <p:cNvPr id="54" name="矩形 53"/>
+            <p:cNvSpPr/>
+            <p:nvPr/>
+          </p:nvSpPr>
+          <p:spPr>
+            <a:xfrm>
+              <a:off x="3569478" y="3351254"/>
+              <a:ext cx="1164242" cy="373648"/>
+            </a:xfrm>
+            <a:prstGeom prst="rect">
+              <a:avLst/>
+            </a:prstGeom>
+          </p:spPr>
+          <p:style>
+            <a:lnRef idx="2">
+              <a:schemeClr val="dk1"/>
+            </a:lnRef>
+            <a:fillRef idx="1">
+              <a:schemeClr val="lt1"/>
+            </a:fillRef>
+            <a:effectRef idx="0">
+              <a:schemeClr val="dk1"/>
+            </a:effectRef>
+            <a:fontRef idx="minor">
+              <a:schemeClr val="dk1"/>
+            </a:fontRef>
+          </p:style>
+          <p:txBody>
+            <a:bodyPr rtlCol="0" anchor="ctr"/>
+            <a:lstStyle/>
+            <a:p>
+              <a:pPr algn="ctr"/>
+              <a:r>
+                <a:rPr lang="zh-CN" altLang="en-US" sz="900" smtClean="0"/>
+                <a:t>将窗口中对应数据</a:t>
+              </a:r>
+              <a:endParaRPr lang="en-US" altLang="zh-CN" sz="900" smtClean="0"/>
+            </a:p>
+            <a:p>
+              <a:pPr algn="ctr"/>
+              <a:r>
+                <a:rPr lang="zh-CN" altLang="en-US" sz="900" smtClean="0"/>
+                <a:t>包标记为已确认</a:t>
+              </a:r>
+              <a:endParaRPr lang="zh-CN" altLang="en-US" sz="900"/>
+            </a:p>
+          </p:txBody>
+        </p:sp>
+        <p:cxnSp>
+          <p:nvCxnSpPr>
+            <p:cNvPr id="56" name="直接箭头连接符 55"/>
+            <p:cNvCxnSpPr>
+              <a:stCxn id="71" idx="2"/>
+              <a:endCxn id="54" idx="0"/>
+            </p:cNvCxnSpPr>
+            <p:nvPr/>
+          </p:nvCxnSpPr>
+          <p:spPr>
+            <a:xfrm flipH="1">
+              <a:off x="4151599" y="3137984"/>
+              <a:ext cx="1" cy="213270"/>
+            </a:xfrm>
+            <a:prstGeom prst="straightConnector1">
+              <a:avLst/>
+            </a:prstGeom>
+            <a:ln>
+              <a:tailEnd type="triangle"/>
+            </a:ln>
+          </p:spPr>
+          <p:style>
+            <a:lnRef idx="2">
+              <a:schemeClr val="dk1"/>
+            </a:lnRef>
+            <a:fillRef idx="0">
+              <a:schemeClr val="dk1"/>
+            </a:fillRef>
+            <a:effectRef idx="1">
+              <a:schemeClr val="dk1"/>
+            </a:effectRef>
+            <a:fontRef idx="minor">
+              <a:schemeClr val="tx1"/>
+            </a:fontRef>
+          </p:style>
+        </p:cxnSp>
+        <p:cxnSp>
+          <p:nvCxnSpPr>
+            <p:cNvPr id="58" name="直接箭头连接符 57"/>
+            <p:cNvCxnSpPr>
+              <a:stCxn id="54" idx="2"/>
+              <a:endCxn id="63" idx="0"/>
+            </p:cNvCxnSpPr>
+            <p:nvPr/>
+          </p:nvCxnSpPr>
+          <p:spPr>
+            <a:xfrm>
+              <a:off x="4151599" y="3724902"/>
+              <a:ext cx="1331" cy="220856"/>
+            </a:xfrm>
+            <a:prstGeom prst="straightConnector1">
+              <a:avLst/>
+            </a:prstGeom>
+            <a:ln>
+              <a:tailEnd type="triangle"/>
+            </a:ln>
+          </p:spPr>
+          <p:style>
+            <a:lnRef idx="2">
+              <a:schemeClr val="dk1"/>
+            </a:lnRef>
+            <a:fillRef idx="0">
+              <a:schemeClr val="dk1"/>
+            </a:fillRef>
+            <a:effectRef idx="1">
+              <a:schemeClr val="dk1"/>
+            </a:effectRef>
+            <a:fontRef idx="minor">
+              <a:schemeClr val="tx1"/>
+            </a:fontRef>
+          </p:style>
+        </p:cxnSp>
+        <p:sp>
+          <p:nvSpPr>
+            <p:cNvPr id="63" name="矩形 62"/>
+            <p:cNvSpPr/>
+            <p:nvPr/>
+          </p:nvSpPr>
+          <p:spPr>
+            <a:xfrm>
+              <a:off x="3707745" y="3945758"/>
+              <a:ext cx="890370" cy="327461"/>
+            </a:xfrm>
+            <a:prstGeom prst="rect">
+              <a:avLst/>
+            </a:prstGeom>
+          </p:spPr>
+          <p:style>
+            <a:lnRef idx="2">
+              <a:schemeClr val="dk1"/>
+            </a:lnRef>
+            <a:fillRef idx="1">
+              <a:schemeClr val="lt1"/>
+            </a:fillRef>
+            <a:effectRef idx="0">
+              <a:schemeClr val="dk1"/>
+            </a:effectRef>
+            <a:fontRef idx="minor">
+              <a:schemeClr val="dk1"/>
+            </a:fontRef>
+          </p:style>
+          <p:txBody>
+            <a:bodyPr rtlCol="0" anchor="ctr"/>
+            <a:lstStyle/>
+            <a:p>
+              <a:pPr algn="ctr"/>
+              <a:r>
+                <a:rPr lang="zh-CN" altLang="en-US" sz="900"/>
+                <a:t>停止</a:t>
+              </a:r>
+              <a:r>
+                <a:rPr lang="zh-CN" altLang="en-US" sz="900" smtClean="0"/>
+                <a:t>对该数据包的定时器</a:t>
+              </a:r>
+              <a:endParaRPr lang="zh-CN" altLang="en-US" sz="900"/>
+            </a:p>
+          </p:txBody>
+        </p:sp>
+        <p:cxnSp>
+          <p:nvCxnSpPr>
+            <p:cNvPr id="67" name="直接箭头连接符 66"/>
+            <p:cNvCxnSpPr>
+              <a:stCxn id="63" idx="2"/>
+              <a:endCxn id="83" idx="0"/>
+            </p:cNvCxnSpPr>
+            <p:nvPr/>
+          </p:nvCxnSpPr>
+          <p:spPr>
+            <a:xfrm flipH="1">
+              <a:off x="4151599" y="4273219"/>
+              <a:ext cx="1331" cy="218797"/>
+            </a:xfrm>
+            <a:prstGeom prst="straightConnector1">
+              <a:avLst/>
+            </a:prstGeom>
+            <a:ln>
+              <a:tailEnd type="triangle"/>
+            </a:ln>
+          </p:spPr>
+          <p:style>
+            <a:lnRef idx="2">
+              <a:schemeClr val="dk1"/>
+            </a:lnRef>
+            <a:fillRef idx="0">
+              <a:schemeClr val="dk1"/>
+            </a:fillRef>
+            <a:effectRef idx="1">
+              <a:schemeClr val="dk1"/>
+            </a:effectRef>
+            <a:fontRef idx="minor">
+              <a:schemeClr val="tx1"/>
+            </a:fontRef>
+          </p:style>
+        </p:cxnSp>
+        <p:cxnSp>
+          <p:nvCxnSpPr>
+            <p:cNvPr id="70" name="直接箭头连接符 69"/>
+            <p:cNvCxnSpPr>
+              <a:stCxn id="83" idx="2"/>
+            </p:cNvCxnSpPr>
+            <p:nvPr/>
+          </p:nvCxnSpPr>
+          <p:spPr>
+            <a:xfrm>
+              <a:off x="4151599" y="4726343"/>
+              <a:ext cx="0" cy="301469"/>
+            </a:xfrm>
+            <a:prstGeom prst="straightConnector1">
+              <a:avLst/>
+            </a:prstGeom>
+            <a:ln>
+              <a:tailEnd type="triangle"/>
+            </a:ln>
+          </p:spPr>
+          <p:style>
+            <a:lnRef idx="2">
+              <a:schemeClr val="dk1"/>
+            </a:lnRef>
+            <a:fillRef idx="0">
+              <a:schemeClr val="dk1"/>
+            </a:fillRef>
+            <a:effectRef idx="1">
+              <a:schemeClr val="dk1"/>
+            </a:effectRef>
+            <a:fontRef idx="minor">
+              <a:schemeClr val="tx1"/>
+            </a:fontRef>
+          </p:style>
+        </p:cxnSp>
+      </p:grpSp>
+    </p:spTree>
+    <p:extLst>
+      <p:ext uri="{BB962C8B-B14F-4D97-AF65-F5344CB8AC3E}">
+        <p14:creationId xmlns:p14="http://schemas.microsoft.com/office/powerpoint/2010/main" val="882630355"/>
+      </p:ext>
+    </p:extLst>
+  </p:cSld>
+  <p:clrMapOvr>
+    <a:masterClrMapping/>
+  </p:clrMapOvr>
+</p:sld>
+</file>
+
+<file path=ppt/slides/slide9.xml><?xml version="1.0" encoding="utf-8"?>
+<p:sld xmlns:a="http://schemas.openxmlformats.org/drawingml/2006/main" xmlns:r="http://schemas.openxmlformats.org/officeDocument/2006/relationships" xmlns:p="http://schemas.openxmlformats.org/presentationml/2006/main">
+  <p:cSld>
+    <p:spTree>
+      <p:nvGrpSpPr>
+        <p:cNvPr id="1" name=""/>
+        <p:cNvGrpSpPr/>
+        <p:nvPr/>
+      </p:nvGrpSpPr>
+      <p:grpSpPr>
+        <a:xfrm>
+          <a:off x="0" y="0"/>
+          <a:ext cx="0" cy="0"/>
+          <a:chOff x="0" y="0"/>
+          <a:chExt cx="0" cy="0"/>
+        </a:xfrm>
+      </p:grpSpPr>
+      <p:grpSp>
+        <p:nvGrpSpPr>
+          <p:cNvPr id="43" name="组合 42"/>
+          <p:cNvGrpSpPr/>
+          <p:nvPr/>
+        </p:nvGrpSpPr>
+        <p:grpSpPr>
+          <a:xfrm>
+            <a:off x="1240637" y="745626"/>
+            <a:ext cx="3334997" cy="3394113"/>
+            <a:chOff x="1240637" y="745626"/>
+            <a:chExt cx="3334997" cy="3394113"/>
+          </a:xfrm>
+        </p:grpSpPr>
+        <p:sp>
+          <p:nvSpPr>
+            <p:cNvPr id="4" name="椭圆 3"/>
+            <p:cNvSpPr/>
+            <p:nvPr/>
+          </p:nvSpPr>
+          <p:spPr>
+            <a:xfrm>
+              <a:off x="3100648" y="745626"/>
+              <a:ext cx="939338" cy="432538"/>
+            </a:xfrm>
+            <a:prstGeom prst="ellipse">
+              <a:avLst/>
+            </a:prstGeom>
+          </p:spPr>
+          <p:style>
+            <a:lnRef idx="2">
+              <a:schemeClr val="dk1"/>
+            </a:lnRef>
+            <a:fillRef idx="1">
+              <a:schemeClr val="lt1"/>
+            </a:fillRef>
+            <a:effectRef idx="0">
+              <a:schemeClr val="dk1"/>
+            </a:effectRef>
+            <a:fontRef idx="minor">
+              <a:schemeClr val="dk1"/>
+            </a:fontRef>
+          </p:style>
+          <p:txBody>
+            <a:bodyPr rtlCol="0" anchor="ctr"/>
+            <a:lstStyle/>
+            <a:p>
+              <a:pPr algn="ctr"/>
+              <a:r>
+                <a:rPr lang="zh-CN" altLang="en-US" sz="900"/>
+                <a:t>接收</a:t>
+              </a:r>
+              <a:r>
+                <a:rPr lang="zh-CN" altLang="en-US" sz="900" smtClean="0"/>
+                <a:t>方</a:t>
+              </a:r>
+              <a:endParaRPr lang="en-US" altLang="zh-CN" sz="900" smtClean="0"/>
+            </a:p>
+            <a:p>
+              <a:pPr algn="ctr"/>
+              <a:r>
+                <a:rPr lang="zh-CN" altLang="en-US" sz="900" smtClean="0"/>
+                <a:t>等待数据</a:t>
+              </a:r>
+              <a:endParaRPr lang="zh-CN" altLang="en-US" sz="900"/>
+            </a:p>
+          </p:txBody>
+        </p:sp>
+        <p:sp>
+          <p:nvSpPr>
+            <p:cNvPr id="5" name="圆角矩形 4"/>
+            <p:cNvSpPr/>
+            <p:nvPr/>
+          </p:nvSpPr>
+          <p:spPr>
+            <a:xfrm>
+              <a:off x="3017069" y="1582284"/>
+              <a:ext cx="1106496" cy="238898"/>
+            </a:xfrm>
+            <a:prstGeom prst="roundRect">
+              <a:avLst/>
+            </a:prstGeom>
+          </p:spPr>
+          <p:style>
+            <a:lnRef idx="2">
+              <a:schemeClr val="dk1"/>
+            </a:lnRef>
+            <a:fillRef idx="1">
+              <a:schemeClr val="lt1"/>
+            </a:fillRef>
+            <a:effectRef idx="0">
+              <a:schemeClr val="dk1"/>
+            </a:effectRef>
+            <a:fontRef idx="minor">
+              <a:schemeClr val="dk1"/>
+            </a:fontRef>
+          </p:style>
+          <p:txBody>
+            <a:bodyPr rtlCol="0" anchor="ctr"/>
+            <a:lstStyle/>
+            <a:p>
+              <a:pPr algn="ctr"/>
+              <a:r>
+                <a:rPr lang="zh-CN" altLang="en-US" sz="900" smtClean="0"/>
+                <a:t>网络层发来数据</a:t>
+              </a:r>
+              <a:endParaRPr lang="zh-CN" altLang="en-US" sz="900"/>
+            </a:p>
+          </p:txBody>
+        </p:sp>
+        <p:cxnSp>
+          <p:nvCxnSpPr>
+            <p:cNvPr id="6" name="直接箭头连接符 5"/>
+            <p:cNvCxnSpPr>
+              <a:stCxn id="4" idx="4"/>
+              <a:endCxn id="5" idx="0"/>
+            </p:cNvCxnSpPr>
+            <p:nvPr/>
+          </p:nvCxnSpPr>
+          <p:spPr>
+            <a:xfrm>
+              <a:off x="3570317" y="1178164"/>
+              <a:ext cx="0" cy="404120"/>
+            </a:xfrm>
+            <a:prstGeom prst="straightConnector1">
+              <a:avLst/>
+            </a:prstGeom>
+            <a:ln>
+              <a:tailEnd type="triangle"/>
+            </a:ln>
+          </p:spPr>
+          <p:style>
+            <a:lnRef idx="2">
+              <a:schemeClr val="dk1"/>
+            </a:lnRef>
+            <a:fillRef idx="0">
+              <a:schemeClr val="dk1"/>
+            </a:fillRef>
+            <a:effectRef idx="1">
+              <a:schemeClr val="dk1"/>
+            </a:effectRef>
+            <a:fontRef idx="minor">
+              <a:schemeClr val="tx1"/>
+            </a:fontRef>
+          </p:style>
+        </p:cxnSp>
+        <p:sp>
+          <p:nvSpPr>
+            <p:cNvPr id="9" name="流程图: 决策 8"/>
+            <p:cNvSpPr/>
+            <p:nvPr/>
+          </p:nvSpPr>
+          <p:spPr>
+            <a:xfrm>
+              <a:off x="2564999" y="2088495"/>
+              <a:ext cx="2010635" cy="554953"/>
+            </a:xfrm>
+            <a:prstGeom prst="flowChartDecision">
+              <a:avLst/>
+            </a:prstGeom>
+          </p:spPr>
+          <p:style>
+            <a:lnRef idx="2">
+              <a:schemeClr val="dk1"/>
+            </a:lnRef>
+            <a:fillRef idx="1">
+              <a:schemeClr val="lt1"/>
+            </a:fillRef>
+            <a:effectRef idx="0">
+              <a:schemeClr val="dk1"/>
+            </a:effectRef>
+            <a:fontRef idx="minor">
+              <a:schemeClr val="dk1"/>
+            </a:fontRef>
+          </p:style>
+          <p:txBody>
+            <a:bodyPr rtlCol="0" anchor="ctr"/>
+            <a:lstStyle/>
+            <a:p>
+              <a:pPr algn="ctr"/>
+              <a:r>
+                <a:rPr lang="zh-CN" altLang="en-US" sz="900" smtClean="0"/>
+                <a:t>数据包完好且</a:t>
+              </a:r>
+              <a:endParaRPr lang="en-US" altLang="zh-CN" sz="900" smtClean="0"/>
+            </a:p>
+            <a:p>
+              <a:pPr algn="ctr"/>
+              <a:r>
+                <a:rPr lang="zh-CN" altLang="en-US" sz="900" smtClean="0"/>
+                <a:t>为期望的数据包？</a:t>
+              </a:r>
+              <a:endParaRPr lang="zh-CN" altLang="en-US" sz="900"/>
+            </a:p>
+          </p:txBody>
+        </p:sp>
+        <p:cxnSp>
+          <p:nvCxnSpPr>
+            <p:cNvPr id="10" name="直接箭头连接符 9"/>
+            <p:cNvCxnSpPr>
+              <a:stCxn id="5" idx="2"/>
+              <a:endCxn id="9" idx="0"/>
+            </p:cNvCxnSpPr>
+            <p:nvPr/>
+          </p:nvCxnSpPr>
+          <p:spPr>
+            <a:xfrm>
+              <a:off x="3570317" y="1821182"/>
+              <a:ext cx="0" cy="267313"/>
+            </a:xfrm>
+            <a:prstGeom prst="straightConnector1">
+              <a:avLst/>
+            </a:prstGeom>
+            <a:ln>
+              <a:tailEnd type="triangle"/>
+            </a:ln>
+          </p:spPr>
+          <p:style>
+            <a:lnRef idx="2">
+              <a:schemeClr val="dk1"/>
+            </a:lnRef>
+            <a:fillRef idx="0">
+              <a:schemeClr val="dk1"/>
+            </a:fillRef>
+            <a:effectRef idx="1">
+              <a:schemeClr val="dk1"/>
+            </a:effectRef>
+            <a:fontRef idx="minor">
+              <a:schemeClr val="tx1"/>
+            </a:fontRef>
+          </p:style>
+        </p:cxnSp>
+        <p:cxnSp>
+          <p:nvCxnSpPr>
+            <p:cNvPr id="13" name="肘形连接符 12"/>
+            <p:cNvCxnSpPr>
+              <a:stCxn id="9" idx="1"/>
+              <a:endCxn id="16" idx="0"/>
+            </p:cNvCxnSpPr>
+            <p:nvPr/>
+          </p:nvCxnSpPr>
+          <p:spPr>
+            <a:xfrm rot="10800000" flipV="1">
+              <a:off x="2086495" y="2365972"/>
+              <a:ext cx="478505" cy="396924"/>
+            </a:xfrm>
+            <a:prstGeom prst="bentConnector2">
+              <a:avLst/>
+            </a:prstGeom>
+            <a:ln>
+              <a:tailEnd type="triangle"/>
+            </a:ln>
+          </p:spPr>
+          <p:style>
+            <a:lnRef idx="2">
+              <a:schemeClr val="dk1"/>
+            </a:lnRef>
+            <a:fillRef idx="0">
+              <a:schemeClr val="dk1"/>
+            </a:fillRef>
+            <a:effectRef idx="1">
+              <a:schemeClr val="dk1"/>
+            </a:effectRef>
+            <a:fontRef idx="minor">
+              <a:schemeClr val="tx1"/>
+            </a:fontRef>
+          </p:style>
+        </p:cxnSp>
+        <p:sp>
+          <p:nvSpPr>
+            <p:cNvPr id="16" name="矩形 15"/>
+            <p:cNvSpPr/>
+            <p:nvPr/>
+          </p:nvSpPr>
+          <p:spPr>
+            <a:xfrm>
+              <a:off x="1463220" y="2762896"/>
+              <a:ext cx="1246547" cy="295730"/>
+            </a:xfrm>
+            <a:prstGeom prst="rect">
+              <a:avLst/>
+            </a:prstGeom>
+          </p:spPr>
+          <p:style>
+            <a:lnRef idx="2">
+              <a:schemeClr val="dk1"/>
+            </a:lnRef>
+            <a:fillRef idx="1">
+              <a:schemeClr val="lt1"/>
+            </a:fillRef>
+            <a:effectRef idx="0">
+              <a:schemeClr val="dk1"/>
+            </a:effectRef>
+            <a:fontRef idx="minor">
+              <a:schemeClr val="dk1"/>
+            </a:fontRef>
+          </p:style>
+          <p:txBody>
+            <a:bodyPr rtlCol="0" anchor="ctr"/>
+            <a:lstStyle/>
+            <a:p>
+              <a:pPr algn="ctr"/>
+              <a:r>
+                <a:rPr lang="zh-CN" altLang="en-US" sz="900" smtClean="0"/>
+                <a:t>重发上一个包的确认</a:t>
+              </a:r>
+              <a:endParaRPr lang="zh-CN" altLang="en-US" sz="900"/>
+            </a:p>
+          </p:txBody>
+        </p:sp>
+        <p:sp>
+          <p:nvSpPr>
+            <p:cNvPr id="19" name="文本框 18"/>
+            <p:cNvSpPr txBox="1"/>
+            <p:nvPr/>
+          </p:nvSpPr>
+          <p:spPr>
+            <a:xfrm>
+              <a:off x="2386293" y="2111818"/>
+              <a:ext cx="319318" cy="230832"/>
+            </a:xfrm>
+            <a:prstGeom prst="rect">
+              <a:avLst/>
+            </a:prstGeom>
+            <a:noFill/>
+          </p:spPr>
+          <p:txBody>
+            <a:bodyPr wrap="none" rtlCol="0">
+              <a:spAutoFit/>
+            </a:bodyPr>
+            <a:lstStyle/>
+            <a:p>
+              <a:r>
+                <a:rPr lang="en-US" altLang="zh-CN" sz="900" smtClean="0"/>
+                <a:t>No</a:t>
+              </a:r>
+              <a:endParaRPr lang="zh-CN" altLang="en-US" sz="900"/>
+            </a:p>
+          </p:txBody>
+        </p:sp>
+        <p:cxnSp>
+          <p:nvCxnSpPr>
+            <p:cNvPr id="20" name="肘形连接符 19"/>
+            <p:cNvCxnSpPr>
+              <a:endCxn id="4" idx="0"/>
+            </p:cNvCxnSpPr>
+            <p:nvPr/>
+          </p:nvCxnSpPr>
+          <p:spPr>
+            <a:xfrm rot="5400000" flipH="1" flipV="1">
+              <a:off x="708421" y="1277843"/>
+              <a:ext cx="3394112" cy="2329679"/>
+            </a:xfrm>
+            <a:prstGeom prst="bentConnector3">
+              <a:avLst>
+                <a:gd name="adj1" fmla="val 106735"/>
+              </a:avLst>
+            </a:prstGeom>
+            <a:ln>
+              <a:tailEnd type="triangle"/>
+            </a:ln>
+          </p:spPr>
+          <p:style>
+            <a:lnRef idx="2">
+              <a:schemeClr val="dk1"/>
+            </a:lnRef>
+            <a:fillRef idx="0">
+              <a:schemeClr val="dk1"/>
+            </a:fillRef>
+            <a:effectRef idx="1">
+              <a:schemeClr val="dk1"/>
+            </a:effectRef>
+            <a:fontRef idx="minor">
+              <a:schemeClr val="tx1"/>
+            </a:fontRef>
+          </p:style>
+        </p:cxnSp>
+        <p:sp>
+          <p:nvSpPr>
+            <p:cNvPr id="23" name="文本框 22"/>
+            <p:cNvSpPr txBox="1"/>
+            <p:nvPr/>
+          </p:nvSpPr>
+          <p:spPr>
+            <a:xfrm>
+              <a:off x="3570316" y="2623330"/>
+              <a:ext cx="343364" cy="230832"/>
+            </a:xfrm>
+            <a:prstGeom prst="rect">
+              <a:avLst/>
+            </a:prstGeom>
+            <a:noFill/>
+          </p:spPr>
+          <p:txBody>
+            <a:bodyPr wrap="none" rtlCol="0">
+              <a:spAutoFit/>
+            </a:bodyPr>
+            <a:lstStyle/>
+            <a:p>
+              <a:r>
+                <a:rPr lang="en-US" altLang="zh-CN" sz="900" smtClean="0"/>
+                <a:t>Yes</a:t>
+              </a:r>
+              <a:endParaRPr lang="zh-CN" altLang="en-US" sz="900"/>
+            </a:p>
+          </p:txBody>
+        </p:sp>
+        <p:sp>
+          <p:nvSpPr>
+            <p:cNvPr id="24" name="矩形 23"/>
+            <p:cNvSpPr/>
+            <p:nvPr/>
+          </p:nvSpPr>
+          <p:spPr>
+            <a:xfrm>
+              <a:off x="2888903" y="3016186"/>
+              <a:ext cx="1362826" cy="295730"/>
+            </a:xfrm>
+            <a:prstGeom prst="rect">
+              <a:avLst/>
+            </a:prstGeom>
+          </p:spPr>
+          <p:style>
+            <a:lnRef idx="2">
+              <a:schemeClr val="dk1"/>
+            </a:lnRef>
+            <a:fillRef idx="1">
+              <a:schemeClr val="lt1"/>
+            </a:fillRef>
+            <a:effectRef idx="0">
+              <a:schemeClr val="dk1"/>
+            </a:effectRef>
+            <a:fontRef idx="minor">
+              <a:schemeClr val="dk1"/>
+            </a:fontRef>
+          </p:style>
+          <p:txBody>
+            <a:bodyPr rtlCol="0" anchor="ctr"/>
+            <a:lstStyle/>
+            <a:p>
+              <a:pPr algn="ctr"/>
+              <a:r>
+                <a:rPr lang="zh-CN" altLang="en-US" sz="900" smtClean="0"/>
+                <a:t>发送当前数据包的确认</a:t>
+              </a:r>
+              <a:endParaRPr lang="zh-CN" altLang="en-US" sz="900"/>
+            </a:p>
+          </p:txBody>
+        </p:sp>
+        <p:cxnSp>
+          <p:nvCxnSpPr>
+            <p:cNvPr id="25" name="直接箭头连接符 24"/>
+            <p:cNvCxnSpPr>
+              <a:stCxn id="9" idx="2"/>
+              <a:endCxn id="24" idx="0"/>
+            </p:cNvCxnSpPr>
+            <p:nvPr/>
+          </p:nvCxnSpPr>
+          <p:spPr>
+            <a:xfrm flipH="1">
+              <a:off x="3570316" y="2643448"/>
+              <a:ext cx="1" cy="372738"/>
+            </a:xfrm>
+            <a:prstGeom prst="straightConnector1">
+              <a:avLst/>
+            </a:prstGeom>
+            <a:ln>
+              <a:tailEnd type="triangle"/>
+            </a:ln>
+          </p:spPr>
+          <p:style>
+            <a:lnRef idx="2">
+              <a:schemeClr val="dk1"/>
+            </a:lnRef>
+            <a:fillRef idx="0">
+              <a:schemeClr val="dk1"/>
+            </a:fillRef>
+            <a:effectRef idx="1">
+              <a:schemeClr val="dk1"/>
+            </a:effectRef>
+            <a:fontRef idx="minor">
+              <a:schemeClr val="tx1"/>
+            </a:fontRef>
+          </p:style>
+        </p:cxnSp>
+        <p:sp>
+          <p:nvSpPr>
+            <p:cNvPr id="29" name="矩形 28"/>
+            <p:cNvSpPr/>
+            <p:nvPr/>
+          </p:nvSpPr>
+          <p:spPr>
+            <a:xfrm>
+              <a:off x="3058859" y="3545847"/>
+              <a:ext cx="1022917" cy="295730"/>
+            </a:xfrm>
+            <a:prstGeom prst="rect">
+              <a:avLst/>
+            </a:prstGeom>
+          </p:spPr>
+          <p:style>
+            <a:lnRef idx="2">
+              <a:schemeClr val="dk1"/>
+            </a:lnRef>
+            <a:fillRef idx="1">
+              <a:schemeClr val="lt1"/>
+            </a:fillRef>
+            <a:effectRef idx="0">
+              <a:schemeClr val="dk1"/>
+            </a:effectRef>
+            <a:fontRef idx="minor">
+              <a:schemeClr val="dk1"/>
+            </a:fontRef>
+          </p:style>
+          <p:txBody>
+            <a:bodyPr rtlCol="0" anchor="ctr"/>
+            <a:lstStyle/>
+            <a:p>
+              <a:pPr algn="ctr"/>
+              <a:r>
+                <a:rPr lang="zh-CN" altLang="en-US" sz="900" smtClean="0"/>
+                <a:t>数据递交应用层</a:t>
+              </a:r>
+              <a:endParaRPr lang="zh-CN" altLang="en-US" sz="900"/>
+            </a:p>
+          </p:txBody>
+        </p:sp>
+        <p:cxnSp>
+          <p:nvCxnSpPr>
+            <p:cNvPr id="30" name="直接箭头连接符 29"/>
+            <p:cNvCxnSpPr>
+              <a:stCxn id="24" idx="2"/>
+              <a:endCxn id="29" idx="0"/>
+            </p:cNvCxnSpPr>
+            <p:nvPr/>
+          </p:nvCxnSpPr>
+          <p:spPr>
+            <a:xfrm>
+              <a:off x="3570316" y="3311916"/>
+              <a:ext cx="2" cy="233931"/>
+            </a:xfrm>
+            <a:prstGeom prst="straightConnector1">
+              <a:avLst/>
+            </a:prstGeom>
+            <a:ln>
+              <a:tailEnd type="triangle"/>
+            </a:ln>
+          </p:spPr>
+          <p:style>
+            <a:lnRef idx="2">
+              <a:schemeClr val="dk1"/>
+            </a:lnRef>
+            <a:fillRef idx="0">
+              <a:schemeClr val="dk1"/>
+            </a:fillRef>
+            <a:effectRef idx="1">
+              <a:schemeClr val="dk1"/>
+            </a:effectRef>
+            <a:fontRef idx="minor">
+              <a:schemeClr val="tx1"/>
+            </a:fontRef>
+          </p:style>
+        </p:cxnSp>
+        <p:cxnSp>
+          <p:nvCxnSpPr>
+            <p:cNvPr id="35" name="直接箭头连接符 34"/>
+            <p:cNvCxnSpPr>
+              <a:stCxn id="29" idx="2"/>
+            </p:cNvCxnSpPr>
+            <p:nvPr/>
+          </p:nvCxnSpPr>
+          <p:spPr>
+            <a:xfrm flipH="1">
+              <a:off x="3570316" y="3841577"/>
+              <a:ext cx="2" cy="298162"/>
+            </a:xfrm>
+            <a:prstGeom prst="straightConnector1">
+              <a:avLst/>
+            </a:prstGeom>
+            <a:ln>
+              <a:tailEnd type="triangle"/>
+            </a:ln>
+          </p:spPr>
+          <p:style>
+            <a:lnRef idx="2">
+              <a:schemeClr val="dk1"/>
+            </a:lnRef>
+            <a:fillRef idx="0">
+              <a:schemeClr val="dk1"/>
+            </a:fillRef>
+            <a:effectRef idx="1">
+              <a:schemeClr val="dk1"/>
+            </a:effectRef>
+            <a:fontRef idx="minor">
+              <a:schemeClr val="tx1"/>
+            </a:fontRef>
+          </p:style>
+        </p:cxnSp>
+        <p:cxnSp>
+          <p:nvCxnSpPr>
+            <p:cNvPr id="36" name="直接连接符 35"/>
+            <p:cNvCxnSpPr/>
+            <p:nvPr/>
+          </p:nvCxnSpPr>
+          <p:spPr>
+            <a:xfrm>
+              <a:off x="1249536" y="4139739"/>
+              <a:ext cx="2320780" cy="0"/>
+            </a:xfrm>
+            <a:prstGeom prst="line">
+              <a:avLst/>
+            </a:prstGeom>
+          </p:spPr>
+          <p:style>
+            <a:lnRef idx="2">
+              <a:schemeClr val="dk1"/>
+            </a:lnRef>
+            <a:fillRef idx="0">
+              <a:schemeClr val="dk1"/>
+            </a:fillRef>
+            <a:effectRef idx="1">
+              <a:schemeClr val="dk1"/>
+            </a:effectRef>
+            <a:fontRef idx="minor">
+              <a:schemeClr val="tx1"/>
+            </a:fontRef>
+          </p:style>
+        </p:cxnSp>
+        <p:cxnSp>
+          <p:nvCxnSpPr>
+            <p:cNvPr id="39" name="直接箭头连接符 38"/>
+            <p:cNvCxnSpPr>
+              <a:stCxn id="16" idx="2"/>
+            </p:cNvCxnSpPr>
+            <p:nvPr/>
+          </p:nvCxnSpPr>
+          <p:spPr>
+            <a:xfrm>
+              <a:off x="2086494" y="3058626"/>
+              <a:ext cx="0" cy="1081113"/>
+            </a:xfrm>
+            <a:prstGeom prst="straightConnector1">
+              <a:avLst/>
+            </a:prstGeom>
+            <a:ln>
+              <a:tailEnd type="triangle"/>
+            </a:ln>
+          </p:spPr>
+          <p:style>
+            <a:lnRef idx="2">
+              <a:schemeClr val="dk1"/>
+            </a:lnRef>
+            <a:fillRef idx="0">
+              <a:schemeClr val="dk1"/>
+            </a:fillRef>
+            <a:effectRef idx="1">
+              <a:schemeClr val="dk1"/>
+            </a:effectRef>
+            <a:fontRef idx="minor">
+              <a:schemeClr val="tx1"/>
+            </a:fontRef>
+          </p:style>
+        </p:cxnSp>
+      </p:grpSp>
+    </p:spTree>
+    <p:extLst>
+      <p:ext uri="{BB962C8B-B14F-4D97-AF65-F5344CB8AC3E}">
+        <p14:creationId xmlns:p14="http://schemas.microsoft.com/office/powerpoint/2010/main" val="2209737263"/>
+      </p:ext>
+    </p:extLst>
+  </p:cSld>
+  <p:clrMapOvr>
+    <a:masterClrMapping/>
+  </p:clrMapOvr>
+</p:sld>
+</file>
+
 <file path=ppt/theme/theme1.xml><?xml version="1.0" encoding="utf-8"?>
 <a:theme xmlns:a="http://schemas.openxmlformats.org/drawingml/2006/main" name="Office 主题​​">
   <a:themeElements>

</xml_diff>